<commit_message>
edit demo, add link to githab
</commit_message>
<xml_diff>
--- a/Demo - Types of testing(ru).pptx
+++ b/Demo - Types of testing(ru).pptx
@@ -111,6 +111,11 @@
       </a:defRPr>
     </a:lvl9pPr>
   </p:defaultTextStyle>
+  <p:extLst>
+    <p:ext uri="{EFAFB233-063F-42B5-8137-9DF3F51BA10A}">
+      <p15:sldGuideLst xmlns:p15="http://schemas.microsoft.com/office/powerpoint/2012/main"/>
+    </p:ext>
+  </p:extLst>
 </p:presentation>
 </file>
 
@@ -4605,7 +4610,7 @@
         </p:nvSpPr>
         <p:spPr>
           <a:xfrm>
-            <a:off x="3165231" y="5008098"/>
+            <a:off x="2167010" y="4811151"/>
             <a:ext cx="8188568" cy="1168864"/>
           </a:xfrm>
         </p:spPr>
@@ -4615,41 +4620,18 @@
           </a:bodyPr>
           <a:lstStyle/>
           <a:p>
+            <a:pPr marL="0" indent="0">
+              <a:buNone/>
+            </a:pPr>
             <a:r>
               <a:rPr lang="ru-RU" sz="1800" dirty="0"/>
-              <a:t>Тестирование документации </a:t>
+              <a:t>Литература - </a:t>
             </a:r>
             <a:r>
               <a:rPr lang="en-US" sz="1800" dirty="0">
                 <a:hlinkClick r:id="rId2"/>
               </a:rPr>
-              <a:t>https://habr.com/ru/post/346290/</a:t>
-            </a:r>
-            <a:endParaRPr lang="ru-RU" sz="1800" dirty="0"/>
-          </a:p>
-          <a:p>
-            <a:r>
-              <a:rPr lang="ru-RU" sz="1800" dirty="0"/>
-              <a:t>Виды тестирования </a:t>
-            </a:r>
-            <a:r>
-              <a:rPr lang="en-US" sz="1800" dirty="0">
-                <a:hlinkClick r:id="rId3"/>
-              </a:rPr>
-              <a:t>http://www.protesting.ru/testing/testtypes.html</a:t>
-            </a:r>
-            <a:endParaRPr lang="ru-RU" sz="1800" dirty="0"/>
-          </a:p>
-          <a:p>
-            <a:r>
-              <a:rPr lang="ru-RU" sz="1800" dirty="0"/>
-              <a:t>Всё тестирование </a:t>
-            </a:r>
-            <a:r>
-              <a:rPr lang="en-US" sz="1800" dirty="0">
-                <a:hlinkClick r:id="rId4"/>
-              </a:rPr>
-              <a:t>https://fktpm.ru/file/116-roman-savin-testirovanie-dot-kom.pdf</a:t>
+              <a:t>https://github.com/bezrukovyura/QaCourse/blob/master/Literature/list.md</a:t>
             </a:r>
             <a:endParaRPr lang="en-US" sz="1800" dirty="0"/>
           </a:p>
@@ -4711,6 +4693,53 @@
           </a:p>
         </p:txBody>
       </p:sp>
+      <p:pic>
+        <p:nvPicPr>
+          <p:cNvPr id="1026" name="Picture 2">
+            <a:extLst>
+              <a:ext uri="{FF2B5EF4-FFF2-40B4-BE49-F238E27FC236}">
+                <a16:creationId xmlns:a16="http://schemas.microsoft.com/office/drawing/2014/main" id="{F404BC2A-892F-489C-B701-C83DAC1F52E0}"/>
+              </a:ext>
+            </a:extLst>
+          </p:cNvPr>
+          <p:cNvPicPr>
+            <a:picLocks noChangeAspect="1" noChangeArrowheads="1"/>
+          </p:cNvPicPr>
+          <p:nvPr/>
+        </p:nvPicPr>
+        <p:blipFill>
+          <a:blip r:embed="rId3">
+            <a:extLst>
+              <a:ext uri="{28A0092B-C50C-407E-A947-70E740481C1C}">
+                <a14:useLocalDpi xmlns:a14="http://schemas.microsoft.com/office/drawing/2010/main" val="0"/>
+              </a:ext>
+            </a:extLst>
+          </a:blip>
+          <a:srcRect/>
+          <a:stretch>
+            <a:fillRect/>
+          </a:stretch>
+        </p:blipFill>
+        <p:spPr bwMode="auto">
+          <a:xfrm>
+            <a:off x="262010" y="4640030"/>
+            <a:ext cx="1905000" cy="1905000"/>
+          </a:xfrm>
+          <a:prstGeom prst="rect">
+            <a:avLst/>
+          </a:prstGeom>
+          <a:noFill/>
+          <a:extLst>
+            <a:ext uri="{909E8E84-426E-40DD-AFC4-6F175D3DCCD1}">
+              <a14:hiddenFill xmlns:a14="http://schemas.microsoft.com/office/drawing/2010/main">
+                <a:solidFill>
+                  <a:srgbClr val="FFFFFF"/>
+                </a:solidFill>
+              </a14:hiddenFill>
+            </a:ext>
+          </a:extLst>
+        </p:spPr>
+      </p:pic>
     </p:spTree>
     <p:extLst>
       <p:ext uri="{BB962C8B-B14F-4D97-AF65-F5344CB8AC3E}">

</xml_diff>